<commit_message>
pushed new results from march 21st
</commit_message>
<xml_diff>
--- a/202107_EXP2/citrate_synthase/CS acitivity calculations.pptx
+++ b/202107_EXP2/citrate_synthase/CS acitivity calculations.pptx
@@ -259,7 +259,7 @@
           <a:p>
             <a:fld id="{C7B82D44-80A1-414C-8550-6C67BD8722F6}" type="datetimeFigureOut">
               <a:rPr lang="en-US" smtClean="0"/>
-              <a:t>1/28/2022</a:t>
+              <a:t>3/21/22</a:t>
             </a:fld>
             <a:endParaRPr lang="en-US"/>
           </a:p>
@@ -457,7 +457,7 @@
           <a:p>
             <a:fld id="{C7B82D44-80A1-414C-8550-6C67BD8722F6}" type="datetimeFigureOut">
               <a:rPr lang="en-US" smtClean="0"/>
-              <a:t>1/28/2022</a:t>
+              <a:t>3/21/22</a:t>
             </a:fld>
             <a:endParaRPr lang="en-US"/>
           </a:p>
@@ -665,7 +665,7 @@
           <a:p>
             <a:fld id="{C7B82D44-80A1-414C-8550-6C67BD8722F6}" type="datetimeFigureOut">
               <a:rPr lang="en-US" smtClean="0"/>
-              <a:t>1/28/2022</a:t>
+              <a:t>3/21/22</a:t>
             </a:fld>
             <a:endParaRPr lang="en-US"/>
           </a:p>
@@ -863,7 +863,7 @@
           <a:p>
             <a:fld id="{C7B82D44-80A1-414C-8550-6C67BD8722F6}" type="datetimeFigureOut">
               <a:rPr lang="en-US" smtClean="0"/>
-              <a:t>1/28/2022</a:t>
+              <a:t>3/21/22</a:t>
             </a:fld>
             <a:endParaRPr lang="en-US"/>
           </a:p>
@@ -1138,7 +1138,7 @@
           <a:p>
             <a:fld id="{C7B82D44-80A1-414C-8550-6C67BD8722F6}" type="datetimeFigureOut">
               <a:rPr lang="en-US" smtClean="0"/>
-              <a:t>1/28/2022</a:t>
+              <a:t>3/21/22</a:t>
             </a:fld>
             <a:endParaRPr lang="en-US"/>
           </a:p>
@@ -1403,7 +1403,7 @@
           <a:p>
             <a:fld id="{C7B82D44-80A1-414C-8550-6C67BD8722F6}" type="datetimeFigureOut">
               <a:rPr lang="en-US" smtClean="0"/>
-              <a:t>1/28/2022</a:t>
+              <a:t>3/21/22</a:t>
             </a:fld>
             <a:endParaRPr lang="en-US"/>
           </a:p>
@@ -1815,7 +1815,7 @@
           <a:p>
             <a:fld id="{C7B82D44-80A1-414C-8550-6C67BD8722F6}" type="datetimeFigureOut">
               <a:rPr lang="en-US" smtClean="0"/>
-              <a:t>1/28/2022</a:t>
+              <a:t>3/21/22</a:t>
             </a:fld>
             <a:endParaRPr lang="en-US"/>
           </a:p>
@@ -1956,7 +1956,7 @@
           <a:p>
             <a:fld id="{C7B82D44-80A1-414C-8550-6C67BD8722F6}" type="datetimeFigureOut">
               <a:rPr lang="en-US" smtClean="0"/>
-              <a:t>1/28/2022</a:t>
+              <a:t>3/21/22</a:t>
             </a:fld>
             <a:endParaRPr lang="en-US"/>
           </a:p>
@@ -2069,7 +2069,7 @@
           <a:p>
             <a:fld id="{C7B82D44-80A1-414C-8550-6C67BD8722F6}" type="datetimeFigureOut">
               <a:rPr lang="en-US" smtClean="0"/>
-              <a:t>1/28/2022</a:t>
+              <a:t>3/21/22</a:t>
             </a:fld>
             <a:endParaRPr lang="en-US"/>
           </a:p>
@@ -2380,7 +2380,7 @@
           <a:p>
             <a:fld id="{C7B82D44-80A1-414C-8550-6C67BD8722F6}" type="datetimeFigureOut">
               <a:rPr lang="en-US" smtClean="0"/>
-              <a:t>1/28/2022</a:t>
+              <a:t>3/21/22</a:t>
             </a:fld>
             <a:endParaRPr lang="en-US"/>
           </a:p>
@@ -2668,7 +2668,7 @@
           <a:p>
             <a:fld id="{C7B82D44-80A1-414C-8550-6C67BD8722F6}" type="datetimeFigureOut">
               <a:rPr lang="en-US" smtClean="0"/>
-              <a:t>1/28/2022</a:t>
+              <a:t>3/21/22</a:t>
             </a:fld>
             <a:endParaRPr lang="en-US"/>
           </a:p>
@@ -2909,7 +2909,7 @@
           <a:p>
             <a:fld id="{C7B82D44-80A1-414C-8550-6C67BD8722F6}" type="datetimeFigureOut">
               <a:rPr lang="en-US" smtClean="0"/>
-              <a:t>1/28/2022</a:t>
+              <a:t>3/21/22</a:t>
             </a:fld>
             <a:endParaRPr lang="en-US"/>
           </a:p>
@@ -3710,8 +3710,8 @@
           </p:sp>
         </mc:Fallback>
       </mc:AlternateContent>
-      <mc:AlternateContent xmlns:mc="http://schemas.openxmlformats.org/markup-compatibility/2006">
-        <mc:Choice xmlns:a14="http://schemas.microsoft.com/office/drawing/2010/main" Requires="a14">
+      <mc:AlternateContent xmlns:mc="http://schemas.openxmlformats.org/markup-compatibility/2006" xmlns:a14="http://schemas.microsoft.com/office/drawing/2010/main">
+        <mc:Choice Requires="a14">
           <p:sp>
             <p:nvSpPr>
               <p:cNvPr id="6" name="TextBox 5">
@@ -3841,7 +3841,7 @@
             </p:txBody>
           </p:sp>
         </mc:Choice>
-        <mc:Fallback>
+        <mc:Fallback xmlns="">
           <p:sp>
             <p:nvSpPr>
               <p:cNvPr id="6" name="TextBox 5">

</xml_diff>